<commit_message>
Commit code and presentation for Global Azure Bootcamp 2024 Jakarta
</commit_message>
<xml_diff>
--- a/src/2024-02/20240228-DotnetConf2023Jakarta/presentation/DotnetConf2023_WhatsNewCS12.pptx
+++ b/src/2024-02/20240228-DotnetConf2023Jakarta/presentation/DotnetConf2023_WhatsNewCS12.pptx
@@ -113,6 +113,11 @@
       </a:defRPr>
     </a:lvl9pPr>
   </p:defaultTextStyle>
+  <p:extLst>
+    <p:ext uri="{EFAFB233-063F-42B5-8137-9DF3F51BA10A}">
+      <p15:sldGuideLst xmlns:p15="http://schemas.microsoft.com/office/powerpoint/2012/main"/>
+    </p:ext>
+  </p:extLst>
 </p:presentation>
 </file>
 
@@ -619,7 +624,7 @@
             <a:fld id="{B61BEF0D-F0BB-DE4B-95CE-6DB70DBA9567}" type="datetimeFigureOut">
               <a:rPr lang="en-US" dirty="0"/>
               <a:pPr/>
-              <a:t>2/24/2024</a:t>
+              <a:t>2/28/2024</a:t>
             </a:fld>
             <a:endParaRPr lang="en-US" dirty="0"/>
           </a:p>
@@ -912,7 +917,7 @@
             <a:fld id="{B61BEF0D-F0BB-DE4B-95CE-6DB70DBA9567}" type="datetimeFigureOut">
               <a:rPr lang="en-US" dirty="0"/>
               <a:pPr/>
-              <a:t>2/24/2024</a:t>
+              <a:t>2/28/2024</a:t>
             </a:fld>
             <a:endParaRPr lang="en-US" dirty="0"/>
           </a:p>
@@ -1157,7 +1162,7 @@
             <a:fld id="{B61BEF0D-F0BB-DE4B-95CE-6DB70DBA9567}" type="datetimeFigureOut">
               <a:rPr lang="en-US" dirty="0"/>
               <a:pPr/>
-              <a:t>2/24/2024</a:t>
+              <a:t>2/28/2024</a:t>
             </a:fld>
             <a:endParaRPr lang="en-US" dirty="0"/>
           </a:p>
@@ -1694,7 +1699,7 @@
             <a:fld id="{B61BEF0D-F0BB-DE4B-95CE-6DB70DBA9567}" type="datetimeFigureOut">
               <a:rPr lang="en-US" dirty="0"/>
               <a:pPr/>
-              <a:t>2/24/2024</a:t>
+              <a:t>2/28/2024</a:t>
             </a:fld>
             <a:endParaRPr lang="en-US" dirty="0"/>
           </a:p>
@@ -1939,7 +1944,7 @@
             <a:fld id="{B61BEF0D-F0BB-DE4B-95CE-6DB70DBA9567}" type="datetimeFigureOut">
               <a:rPr lang="en-US" dirty="0"/>
               <a:pPr/>
-              <a:t>2/24/2024</a:t>
+              <a:t>2/28/2024</a:t>
             </a:fld>
             <a:endParaRPr lang="en-US" dirty="0"/>
           </a:p>
@@ -2468,7 +2473,7 @@
             <a:fld id="{B61BEF0D-F0BB-DE4B-95CE-6DB70DBA9567}" type="datetimeFigureOut">
               <a:rPr lang="en-US" dirty="0"/>
               <a:pPr/>
-              <a:t>2/24/2024</a:t>
+              <a:t>2/28/2024</a:t>
             </a:fld>
             <a:endParaRPr lang="en-US" dirty="0"/>
           </a:p>
@@ -2762,7 +2767,7 @@
             <a:fld id="{B61BEF0D-F0BB-DE4B-95CE-6DB70DBA9567}" type="datetimeFigureOut">
               <a:rPr lang="en-US" dirty="0"/>
               <a:pPr/>
-              <a:t>2/24/2024</a:t>
+              <a:t>2/28/2024</a:t>
             </a:fld>
             <a:endParaRPr lang="en-US" dirty="0"/>
           </a:p>
@@ -2933,7 +2938,7 @@
             <a:fld id="{B61BEF0D-F0BB-DE4B-95CE-6DB70DBA9567}" type="datetimeFigureOut">
               <a:rPr lang="en-US" dirty="0"/>
               <a:pPr/>
-              <a:t>2/24/2024</a:t>
+              <a:t>2/28/2024</a:t>
             </a:fld>
             <a:endParaRPr lang="en-US" dirty="0"/>
           </a:p>
@@ -3110,7 +3115,7 @@
             <a:fld id="{B61BEF0D-F0BB-DE4B-95CE-6DB70DBA9567}" type="datetimeFigureOut">
               <a:rPr lang="en-US" dirty="0"/>
               <a:pPr/>
-              <a:t>2/24/2024</a:t>
+              <a:t>2/28/2024</a:t>
             </a:fld>
             <a:endParaRPr lang="en-US" dirty="0"/>
           </a:p>
@@ -3277,7 +3282,7 @@
             <a:fld id="{B61BEF0D-F0BB-DE4B-95CE-6DB70DBA9567}" type="datetimeFigureOut">
               <a:rPr lang="en-US" dirty="0"/>
               <a:pPr/>
-              <a:t>2/24/2024</a:t>
+              <a:t>2/28/2024</a:t>
             </a:fld>
             <a:endParaRPr lang="en-US" dirty="0"/>
           </a:p>
@@ -3525,7 +3530,7 @@
             <a:fld id="{B61BEF0D-F0BB-DE4B-95CE-6DB70DBA9567}" type="datetimeFigureOut">
               <a:rPr lang="en-US" dirty="0"/>
               <a:pPr/>
-              <a:t>2/24/2024</a:t>
+              <a:t>2/28/2024</a:t>
             </a:fld>
             <a:endParaRPr lang="en-US" dirty="0"/>
           </a:p>
@@ -3819,7 +3824,7 @@
             <a:fld id="{B61BEF0D-F0BB-DE4B-95CE-6DB70DBA9567}" type="datetimeFigureOut">
               <a:rPr lang="en-US" dirty="0"/>
               <a:pPr/>
-              <a:t>2/24/2024</a:t>
+              <a:t>2/28/2024</a:t>
             </a:fld>
             <a:endParaRPr lang="en-US" dirty="0"/>
           </a:p>
@@ -4258,7 +4263,7 @@
             <a:fld id="{B61BEF0D-F0BB-DE4B-95CE-6DB70DBA9567}" type="datetimeFigureOut">
               <a:rPr lang="en-US" dirty="0"/>
               <a:pPr/>
-              <a:t>2/24/2024</a:t>
+              <a:t>2/28/2024</a:t>
             </a:fld>
             <a:endParaRPr lang="en-US" dirty="0"/>
           </a:p>
@@ -4373,7 +4378,7 @@
             <a:fld id="{B61BEF0D-F0BB-DE4B-95CE-6DB70DBA9567}" type="datetimeFigureOut">
               <a:rPr lang="en-US" dirty="0"/>
               <a:pPr/>
-              <a:t>2/24/2024</a:t>
+              <a:t>2/28/2024</a:t>
             </a:fld>
             <a:endParaRPr lang="en-US" dirty="0"/>
           </a:p>
@@ -4465,7 +4470,7 @@
             <a:fld id="{B61BEF0D-F0BB-DE4B-95CE-6DB70DBA9567}" type="datetimeFigureOut">
               <a:rPr lang="en-US" dirty="0"/>
               <a:pPr/>
-              <a:t>2/24/2024</a:t>
+              <a:t>2/28/2024</a:t>
             </a:fld>
             <a:endParaRPr lang="en-US" dirty="0"/>
           </a:p>
@@ -4745,7 +4750,7 @@
             <a:fld id="{B61BEF0D-F0BB-DE4B-95CE-6DB70DBA9567}" type="datetimeFigureOut">
               <a:rPr lang="en-US" dirty="0"/>
               <a:pPr/>
-              <a:t>2/24/2024</a:t>
+              <a:t>2/28/2024</a:t>
             </a:fld>
             <a:endParaRPr lang="en-US" dirty="0"/>
           </a:p>
@@ -5033,7 +5038,7 @@
             <a:fld id="{B61BEF0D-F0BB-DE4B-95CE-6DB70DBA9567}" type="datetimeFigureOut">
               <a:rPr lang="en-US" dirty="0"/>
               <a:pPr/>
-              <a:t>2/24/2024</a:t>
+              <a:t>2/28/2024</a:t>
             </a:fld>
             <a:endParaRPr lang="en-US" dirty="0"/>
           </a:p>
@@ -5560,7 +5565,7 @@
             <a:fld id="{B61BEF0D-F0BB-DE4B-95CE-6DB70DBA9567}" type="datetimeFigureOut">
               <a:rPr lang="en-US" dirty="0"/>
               <a:pPr/>
-              <a:t>2/24/2024</a:t>
+              <a:t>2/28/2024</a:t>
             </a:fld>
             <a:endParaRPr lang="en-US" dirty="0"/>
           </a:p>
@@ -6222,7 +6227,24 @@
           <a:bodyPr/>
           <a:lstStyle/>
           <a:p>
-            <a:endParaRPr lang="en-US"/>
+            <a:r>
+              <a:rPr lang="en-US" dirty="0"/>
+              <a:t>Download this presentation and codes </a:t>
+            </a:r>
+            <a:r>
+              <a:rPr lang="en-US"/>
+              <a:t>is available at: </a:t>
+            </a:r>
+            <a:r>
+              <a:rPr lang="en-US">
+                <a:hlinkClick r:id="rId2"/>
+              </a:rPr>
+              <a:t>https://bit.ly/eriawanspeak2024</a:t>
+            </a:r>
+            <a:r>
+              <a:rPr lang="en-US"/>
+              <a:t> </a:t>
+            </a:r>
           </a:p>
         </p:txBody>
       </p:sp>

</xml_diff>